<commit_message>
Update 190609 나비오 드론 제작 매뉴얼 V1.1.pptx
</commit_message>
<xml_diff>
--- a/110 매뉴얼/190609 나비오 드론 제작 매뉴얼 V1.1.pptx
+++ b/110 매뉴얼/190609 나비오 드론 제작 매뉴얼 V1.1.pptx
@@ -7997,7 +7997,7 @@
           <a:p>
             <a:fld id="{60456C2F-1F67-44A5-80B0-9C3A6CA33C82}" type="datetimeFigureOut">
               <a:rPr lang="en-US" smtClean="0"/>
-              <a:t>6/15/2019</a:t>
+              <a:t>6/21/2019</a:t>
             </a:fld>
             <a:endParaRPr lang="en-US"/>
           </a:p>
@@ -8832,7 +8832,7 @@
           <a:p>
             <a:fld id="{C6DFEB83-A204-40B8-B593-81BAB2317EA1}" type="datetime1">
               <a:rPr lang="ko-KR" altLang="en-US" smtClean="0"/>
-              <a:t>2019-06-15</a:t>
+              <a:t>2019-06-21</a:t>
             </a:fld>
             <a:endParaRPr lang="en-US"/>
           </a:p>
@@ -8954,7 +8954,7 @@
           <a:p>
             <a:fld id="{F752EDE3-6E75-4046-9053-6B4E2492D3B0}" type="datetime1">
               <a:rPr lang="ko-KR" altLang="en-US" smtClean="0"/>
-              <a:t>2019-06-15</a:t>
+              <a:t>2019-06-21</a:t>
             </a:fld>
             <a:endParaRPr lang="en-US"/>
           </a:p>
@@ -9101,7 +9101,7 @@
           <a:p>
             <a:fld id="{9B82DC21-AC1D-4040-957D-48228A45CDB7}" type="datetime1">
               <a:rPr lang="ko-KR" altLang="en-US" smtClean="0"/>
-              <a:t>2019-06-15</a:t>
+              <a:t>2019-06-21</a:t>
             </a:fld>
             <a:endParaRPr lang="en-US"/>
           </a:p>
@@ -9275,7 +9275,7 @@
           <a:p>
             <a:fld id="{EAE9C953-F340-4663-A197-CCE7263E45BC}" type="datetime1">
               <a:rPr lang="ko-KR" altLang="en-US" smtClean="0"/>
-              <a:t>2019-06-15</a:t>
+              <a:t>2019-06-21</a:t>
             </a:fld>
             <a:endParaRPr lang="en-US"/>
           </a:p>
@@ -9526,7 +9526,7 @@
           <a:p>
             <a:fld id="{EAE9C953-F340-4663-A197-CCE7263E45BC}" type="datetime1">
               <a:rPr lang="ko-KR" altLang="en-US" smtClean="0"/>
-              <a:t>2019-06-15</a:t>
+              <a:t>2019-06-21</a:t>
             </a:fld>
             <a:endParaRPr lang="en-US"/>
           </a:p>
@@ -9842,7 +9842,7 @@
           <a:p>
             <a:fld id="{890399D1-6C1C-4B03-B08C-60A601F2EFBA}" type="datetime1">
               <a:rPr lang="ko-KR" altLang="en-US" smtClean="0"/>
-              <a:t>2019-06-15</a:t>
+              <a:t>2019-06-21</a:t>
             </a:fld>
             <a:endParaRPr lang="en-US"/>
           </a:p>
@@ -10178,7 +10178,7 @@
           <a:p>
             <a:fld id="{CB251830-6212-4CA9-A1A3-4280ABBDDAB8}" type="datetime1">
               <a:rPr lang="ko-KR" altLang="en-US" smtClean="0"/>
-              <a:t>2019-06-15</a:t>
+              <a:t>2019-06-21</a:t>
             </a:fld>
             <a:endParaRPr lang="en-US"/>
           </a:p>
@@ -10519,7 +10519,7 @@
           <a:p>
             <a:fld id="{CB251830-6212-4CA9-A1A3-4280ABBDDAB8}" type="datetime1">
               <a:rPr lang="ko-KR" altLang="en-US" smtClean="0"/>
-              <a:t>2019-06-15</a:t>
+              <a:t>2019-06-21</a:t>
             </a:fld>
             <a:endParaRPr lang="en-US"/>
           </a:p>
@@ -10798,7 +10798,7 @@
           <a:p>
             <a:fld id="{33C64400-840D-4EE1-8A5A-B5A1894C0565}" type="datetime1">
               <a:rPr lang="ko-KR" altLang="en-US" smtClean="0"/>
-              <a:t>2019-06-15</a:t>
+              <a:t>2019-06-21</a:t>
             </a:fld>
             <a:endParaRPr lang="en-US"/>
           </a:p>
@@ -11114,7 +11114,7 @@
           <a:p>
             <a:fld id="{890399D1-6C1C-4B03-B08C-60A601F2EFBA}" type="datetime1">
               <a:rPr lang="ko-KR" altLang="en-US" smtClean="0"/>
-              <a:t>2019-06-15</a:t>
+              <a:t>2019-06-21</a:t>
             </a:fld>
             <a:endParaRPr lang="en-US"/>
           </a:p>
@@ -11528,7 +11528,7 @@
           <a:p>
             <a:fld id="{A05A85B3-D7AB-4ED4-92E7-BC2AAC4C46C4}" type="datetime1">
               <a:rPr lang="ko-KR" altLang="en-US" smtClean="0"/>
-              <a:t>2019-06-15</a:t>
+              <a:t>2019-06-21</a:t>
             </a:fld>
             <a:endParaRPr lang="en-US"/>
           </a:p>
@@ -11747,7 +11747,7 @@
           <a:p>
             <a:fld id="{FC11DF4A-87B9-4806-B30E-57A4F6A739DC}" type="datetime1">
               <a:rPr lang="ko-KR" altLang="en-US" smtClean="0"/>
-              <a:t>2019-06-15</a:t>
+              <a:t>2019-06-21</a:t>
             </a:fld>
             <a:endParaRPr lang="en-US"/>
           </a:p>
@@ -12759,7 +12759,7 @@
           <a:p>
             <a:fld id="{EAE9C953-F340-4663-A197-CCE7263E45BC}" type="datetime1">
               <a:rPr lang="ko-KR" altLang="en-US" smtClean="0"/>
-              <a:t>2019-06-15</a:t>
+              <a:t>2019-06-21</a:t>
             </a:fld>
             <a:endParaRPr lang="en-US"/>
           </a:p>
@@ -12958,7 +12958,7 @@
           <a:p>
             <a:fld id="{EAE9C953-F340-4663-A197-CCE7263E45BC}" type="datetime1">
               <a:rPr lang="ko-KR" altLang="en-US" smtClean="0"/>
-              <a:t>2019-06-15</a:t>
+              <a:t>2019-06-21</a:t>
             </a:fld>
             <a:endParaRPr lang="en-US"/>
           </a:p>
@@ -13130,7 +13130,15 @@
             </a:r>
             <a:r>
               <a:rPr lang="ko-KR" altLang="en-US" smtClean="0"/>
-              <a:t> 공급</a:t>
+              <a:t> </a:t>
+            </a:r>
+            <a:r>
+              <a:rPr lang="ko-KR" altLang="en-US" smtClean="0"/>
+              <a:t>공급 </a:t>
+            </a:r>
+            <a:r>
+              <a:rPr lang="en-US" altLang="ko-KR" smtClean="0"/>
+              <a:t>2</a:t>
             </a:r>
             <a:endParaRPr lang="en-US"/>
           </a:p>
@@ -13153,7 +13161,7 @@
           <a:p>
             <a:fld id="{EAE9C953-F340-4663-A197-CCE7263E45BC}" type="datetime1">
               <a:rPr lang="ko-KR" altLang="en-US" smtClean="0"/>
-              <a:t>2019-06-15</a:t>
+              <a:t>2019-06-21</a:t>
             </a:fld>
             <a:endParaRPr lang="en-US"/>
           </a:p>
@@ -13228,7 +13236,7 @@
         </p:blipFill>
         <p:spPr bwMode="auto">
           <a:xfrm>
-            <a:off x="5691673" y="3390279"/>
+            <a:off x="681038" y="1385135"/>
             <a:ext cx="3786101" cy="2524067"/>
           </a:xfrm>
           <a:prstGeom prst="rect">
@@ -13271,8 +13279,8 @@
         </p:blipFill>
         <p:spPr bwMode="auto">
           <a:xfrm>
-            <a:off x="681039" y="1496811"/>
-            <a:ext cx="5197248" cy="2700265"/>
+            <a:off x="2610927" y="2208508"/>
+            <a:ext cx="7021840" cy="3648244"/>
           </a:xfrm>
           <a:prstGeom prst="rect">
             <a:avLst/>
@@ -13389,7 +13397,7 @@
           <a:p>
             <a:fld id="{EAE9C953-F340-4663-A197-CCE7263E45BC}" type="datetime1">
               <a:rPr lang="ko-KR" altLang="en-US" smtClean="0"/>
-              <a:t>2019-06-15</a:t>
+              <a:t>2019-06-21</a:t>
             </a:fld>
             <a:endParaRPr lang="en-US"/>
           </a:p>
@@ -13555,7 +13563,7 @@
           <a:p>
             <a:fld id="{EAE9C953-F340-4663-A197-CCE7263E45BC}" type="datetime1">
               <a:rPr lang="ko-KR" altLang="en-US" smtClean="0"/>
-              <a:t>2019-06-15</a:t>
+              <a:t>2019-06-21</a:t>
             </a:fld>
             <a:endParaRPr lang="en-US"/>
           </a:p>
@@ -13623,8 +13631,8 @@
         </p:blipFill>
         <p:spPr>
           <a:xfrm>
-            <a:off x="3281363" y="1704794"/>
-            <a:ext cx="5600855" cy="4270054"/>
+            <a:off x="3944319" y="2582463"/>
+            <a:ext cx="4795235" cy="3655855"/>
           </a:xfrm>
           <a:prstGeom prst="rect">
             <a:avLst/>
@@ -13774,7 +13782,7 @@
           <a:p>
             <a:fld id="{EAE9C953-F340-4663-A197-CCE7263E45BC}" type="datetime1">
               <a:rPr lang="ko-KR" altLang="en-US" smtClean="0"/>
-              <a:t>2019-06-15</a:t>
+              <a:t>2019-06-21</a:t>
             </a:fld>
             <a:endParaRPr lang="en-US"/>
           </a:p>
@@ -14014,7 +14022,7 @@
           <a:p>
             <a:fld id="{EAE9C953-F340-4663-A197-CCE7263E45BC}" type="datetime1">
               <a:rPr lang="ko-KR" altLang="en-US" smtClean="0"/>
-              <a:t>2019-06-15</a:t>
+              <a:t>2019-06-21</a:t>
             </a:fld>
             <a:endParaRPr lang="en-US"/>
           </a:p>
@@ -14248,7 +14256,7 @@
           <a:p>
             <a:fld id="{EAE9C953-F340-4663-A197-CCE7263E45BC}" type="datetime1">
               <a:rPr lang="ko-KR" altLang="en-US" smtClean="0"/>
-              <a:t>2019-06-15</a:t>
+              <a:t>2019-06-21</a:t>
             </a:fld>
             <a:endParaRPr lang="en-US"/>
           </a:p>
@@ -14443,7 +14451,7 @@
           <a:p>
             <a:fld id="{EAE9C953-F340-4663-A197-CCE7263E45BC}" type="datetime1">
               <a:rPr lang="ko-KR" altLang="en-US" smtClean="0"/>
-              <a:t>2019-06-15</a:t>
+              <a:t>2019-06-21</a:t>
             </a:fld>
             <a:endParaRPr lang="en-US"/>
           </a:p>
@@ -14616,7 +14624,7 @@
           <a:p>
             <a:fld id="{CB251830-6212-4CA9-A1A3-4280ABBDDAB8}" type="datetime1">
               <a:rPr lang="ko-KR" altLang="en-US" smtClean="0"/>
-              <a:t>2019-06-15</a:t>
+              <a:t>2019-06-21</a:t>
             </a:fld>
             <a:endParaRPr lang="en-US"/>
           </a:p>
@@ -14779,7 +14787,7 @@
           <a:p>
             <a:fld id="{EAE9C953-F340-4663-A197-CCE7263E45BC}" type="datetime1">
               <a:rPr lang="ko-KR" altLang="en-US" smtClean="0"/>
-              <a:t>2019-06-15</a:t>
+              <a:t>2019-06-21</a:t>
             </a:fld>
             <a:endParaRPr lang="en-US"/>
           </a:p>
@@ -15044,7 +15052,7 @@
           <a:p>
             <a:fld id="{EAE9C953-F340-4663-A197-CCE7263E45BC}" type="datetime1">
               <a:rPr lang="ko-KR" altLang="en-US" smtClean="0"/>
-              <a:t>2019-06-15</a:t>
+              <a:t>2019-06-21</a:t>
             </a:fld>
             <a:endParaRPr lang="en-US"/>
           </a:p>
@@ -15221,7 +15229,7 @@
           <a:p>
             <a:fld id="{CB251830-6212-4CA9-A1A3-4280ABBDDAB8}" type="datetime1">
               <a:rPr lang="ko-KR" altLang="en-US" smtClean="0"/>
-              <a:t>2019-06-15</a:t>
+              <a:t>2019-06-21</a:t>
             </a:fld>
             <a:endParaRPr lang="en-US"/>
           </a:p>
@@ -15385,7 +15393,7 @@
           <a:p>
             <a:fld id="{EAE9C953-F340-4663-A197-CCE7263E45BC}" type="datetime1">
               <a:rPr lang="ko-KR" altLang="en-US" smtClean="0"/>
-              <a:t>2019-06-15</a:t>
+              <a:t>2019-06-21</a:t>
             </a:fld>
             <a:endParaRPr lang="en-US"/>
           </a:p>
@@ -15629,7 +15637,7 @@
           <a:p>
             <a:fld id="{EAE9C953-F340-4663-A197-CCE7263E45BC}" type="datetime1">
               <a:rPr lang="ko-KR" altLang="en-US" smtClean="0"/>
-              <a:t>2019-06-15</a:t>
+              <a:t>2019-06-21</a:t>
             </a:fld>
             <a:endParaRPr lang="en-US"/>
           </a:p>
@@ -15826,7 +15834,7 @@
           <a:p>
             <a:fld id="{EAE9C953-F340-4663-A197-CCE7263E45BC}" type="datetime1">
               <a:rPr lang="ko-KR" altLang="en-US" smtClean="0"/>
-              <a:t>2019-06-15</a:t>
+              <a:t>2019-06-21</a:t>
             </a:fld>
             <a:endParaRPr lang="en-US"/>
           </a:p>
@@ -16063,7 +16071,7 @@
           <a:p>
             <a:fld id="{EAE9C953-F340-4663-A197-CCE7263E45BC}" type="datetime1">
               <a:rPr lang="ko-KR" altLang="en-US" smtClean="0"/>
-              <a:t>2019-06-15</a:t>
+              <a:t>2019-06-21</a:t>
             </a:fld>
             <a:endParaRPr lang="en-US"/>
           </a:p>
@@ -16237,7 +16245,7 @@
           <a:p>
             <a:fld id="{EAE9C953-F340-4663-A197-CCE7263E45BC}" type="datetime1">
               <a:rPr lang="ko-KR" altLang="en-US" smtClean="0"/>
-              <a:t>2019-06-15</a:t>
+              <a:t>2019-06-21</a:t>
             </a:fld>
             <a:endParaRPr lang="en-US"/>
           </a:p>
@@ -16877,7 +16885,7 @@
           <a:p>
             <a:fld id="{EAE9C953-F340-4663-A197-CCE7263E45BC}" type="datetime1">
               <a:rPr lang="ko-KR" altLang="en-US" smtClean="0"/>
-              <a:t>2019-06-15</a:t>
+              <a:t>2019-06-21</a:t>
             </a:fld>
             <a:endParaRPr lang="en-US"/>
           </a:p>
@@ -17162,7 +17170,7 @@
           <a:p>
             <a:fld id="{EAE9C953-F340-4663-A197-CCE7263E45BC}" type="datetime1">
               <a:rPr lang="ko-KR" altLang="en-US" smtClean="0"/>
-              <a:t>2019-06-15</a:t>
+              <a:t>2019-06-21</a:t>
             </a:fld>
             <a:endParaRPr lang="en-US"/>
           </a:p>
@@ -17437,7 +17445,7 @@
           <a:p>
             <a:fld id="{EAE9C953-F340-4663-A197-CCE7263E45BC}" type="datetime1">
               <a:rPr lang="ko-KR" altLang="en-US" smtClean="0"/>
-              <a:t>2019-06-15</a:t>
+              <a:t>2019-06-21</a:t>
             </a:fld>
             <a:endParaRPr lang="en-US"/>
           </a:p>
@@ -17627,7 +17635,7 @@
           <a:p>
             <a:fld id="{CB251830-6212-4CA9-A1A3-4280ABBDDAB8}" type="datetime1">
               <a:rPr lang="ko-KR" altLang="en-US" smtClean="0"/>
-              <a:t>2019-06-15</a:t>
+              <a:t>2019-06-21</a:t>
             </a:fld>
             <a:endParaRPr lang="en-US"/>
           </a:p>
@@ -18025,7 +18033,7 @@
           <a:p>
             <a:fld id="{EAE9C953-F340-4663-A197-CCE7263E45BC}" type="datetime1">
               <a:rPr lang="ko-KR" altLang="en-US" smtClean="0"/>
-              <a:t>2019-06-15</a:t>
+              <a:t>2019-06-21</a:t>
             </a:fld>
             <a:endParaRPr lang="en-US"/>
           </a:p>
@@ -20257,7 +20265,7 @@
           <a:p>
             <a:fld id="{93A792C4-C320-43A2-8ECE-CE47FEC71D10}" type="datetime1">
               <a:rPr lang="ko-KR" altLang="en-US" smtClean="0"/>
-              <a:t>2019-06-15</a:t>
+              <a:t>2019-06-21</a:t>
             </a:fld>
             <a:endParaRPr lang="en-US"/>
           </a:p>
@@ -20537,7 +20545,7 @@
           <a:p>
             <a:fld id="{EAE9C953-F340-4663-A197-CCE7263E45BC}" type="datetime1">
               <a:rPr lang="ko-KR" altLang="en-US" smtClean="0"/>
-              <a:t>2019-06-15</a:t>
+              <a:t>2019-06-21</a:t>
             </a:fld>
             <a:endParaRPr lang="en-US"/>
           </a:p>
@@ -20756,7 +20764,7 @@
           <a:p>
             <a:fld id="{EAE9C953-F340-4663-A197-CCE7263E45BC}" type="datetime1">
               <a:rPr lang="ko-KR" altLang="en-US" smtClean="0"/>
-              <a:t>2019-06-15</a:t>
+              <a:t>2019-06-21</a:t>
             </a:fld>
             <a:endParaRPr lang="en-US"/>
           </a:p>
@@ -20994,7 +21002,7 @@
           <a:p>
             <a:fld id="{CB251830-6212-4CA9-A1A3-4280ABBDDAB8}" type="datetime1">
               <a:rPr lang="ko-KR" altLang="en-US" smtClean="0"/>
-              <a:t>2019-06-15</a:t>
+              <a:t>2019-06-21</a:t>
             </a:fld>
             <a:endParaRPr lang="en-US"/>
           </a:p>
@@ -21132,7 +21140,7 @@
           <a:p>
             <a:fld id="{EAE9C953-F340-4663-A197-CCE7263E45BC}" type="datetime1">
               <a:rPr lang="ko-KR" altLang="en-US" smtClean="0"/>
-              <a:t>2019-06-15</a:t>
+              <a:t>2019-06-21</a:t>
             </a:fld>
             <a:endParaRPr lang="en-US"/>
           </a:p>
@@ -21336,7 +21344,7 @@
           <a:p>
             <a:fld id="{9B82DC21-AC1D-4040-957D-48228A45CDB7}" type="datetime1">
               <a:rPr lang="ko-KR" altLang="en-US" smtClean="0"/>
-              <a:t>2019-06-15</a:t>
+              <a:t>2019-06-21</a:t>
             </a:fld>
             <a:endParaRPr lang="en-US"/>
           </a:p>
@@ -21461,7 +21469,7 @@
           <a:p>
             <a:fld id="{9B82DC21-AC1D-4040-957D-48228A45CDB7}" type="datetime1">
               <a:rPr lang="ko-KR" altLang="en-US" smtClean="0"/>
-              <a:t>2019-06-15</a:t>
+              <a:t>2019-06-21</a:t>
             </a:fld>
             <a:endParaRPr lang="en-US"/>
           </a:p>

</xml_diff>